<commit_message>
Finalizando Artigo - 20/02/2024 - Leo
</commit_message>
<xml_diff>
--- a/documents/Apresentação - Leonardo Aderaldo Vargas.pptx
+++ b/documents/Apresentação - Leonardo Aderaldo Vargas.pptx
@@ -220,7 +220,7 @@
           <a:p>
             <a:fld id="{35D1AE1C-141D-4753-8486-1EC71561FCC8}" type="datetimeFigureOut">
               <a:rPr lang="pt-BR" smtClean="0"/>
-              <a:t>11/02/2024</a:t>
+              <a:t>20/02/2024</a:t>
             </a:fld>
             <a:endParaRPr lang="pt-BR"/>
           </a:p>
@@ -397,7 +397,7 @@
           <a:p>
             <a:fld id="{626C5BD6-938E-4BE3-B656-F207E3F7ECB7}" type="datetimeFigureOut">
               <a:rPr lang="pt-BR" smtClean="0"/>
-              <a:t>11/02/2024</a:t>
+              <a:t>20/02/2024</a:t>
             </a:fld>
             <a:endParaRPr lang="pt-BR"/>
           </a:p>
@@ -1003,7 +1003,7 @@
           <a:p>
             <a:fld id="{2A8F3A04-A449-4461-BE57-D0A4985AEFEF}" type="datetimeFigureOut">
               <a:rPr lang="pt-BR" smtClean="0"/>
-              <a:t>11/02/2024</a:t>
+              <a:t>20/02/2024</a:t>
             </a:fld>
             <a:endParaRPr lang="pt-BR"/>
           </a:p>
@@ -1201,7 +1201,7 @@
           <a:p>
             <a:fld id="{2A8F3A04-A449-4461-BE57-D0A4985AEFEF}" type="datetimeFigureOut">
               <a:rPr lang="pt-BR" smtClean="0"/>
-              <a:t>11/02/2024</a:t>
+              <a:t>20/02/2024</a:t>
             </a:fld>
             <a:endParaRPr lang="pt-BR"/>
           </a:p>
@@ -1409,7 +1409,7 @@
           <a:p>
             <a:fld id="{2A8F3A04-A449-4461-BE57-D0A4985AEFEF}" type="datetimeFigureOut">
               <a:rPr lang="pt-BR" smtClean="0"/>
-              <a:t>11/02/2024</a:t>
+              <a:t>20/02/2024</a:t>
             </a:fld>
             <a:endParaRPr lang="pt-BR"/>
           </a:p>
@@ -1607,7 +1607,7 @@
           <a:p>
             <a:fld id="{2A8F3A04-A449-4461-BE57-D0A4985AEFEF}" type="datetimeFigureOut">
               <a:rPr lang="pt-BR" smtClean="0"/>
-              <a:t>11/02/2024</a:t>
+              <a:t>20/02/2024</a:t>
             </a:fld>
             <a:endParaRPr lang="pt-BR"/>
           </a:p>
@@ -1882,7 +1882,7 @@
           <a:p>
             <a:fld id="{2A8F3A04-A449-4461-BE57-D0A4985AEFEF}" type="datetimeFigureOut">
               <a:rPr lang="pt-BR" smtClean="0"/>
-              <a:t>11/02/2024</a:t>
+              <a:t>20/02/2024</a:t>
             </a:fld>
             <a:endParaRPr lang="pt-BR"/>
           </a:p>
@@ -2147,7 +2147,7 @@
           <a:p>
             <a:fld id="{2A8F3A04-A449-4461-BE57-D0A4985AEFEF}" type="datetimeFigureOut">
               <a:rPr lang="pt-BR" smtClean="0"/>
-              <a:t>11/02/2024</a:t>
+              <a:t>20/02/2024</a:t>
             </a:fld>
             <a:endParaRPr lang="pt-BR"/>
           </a:p>
@@ -2559,7 +2559,7 @@
           <a:p>
             <a:fld id="{2A8F3A04-A449-4461-BE57-D0A4985AEFEF}" type="datetimeFigureOut">
               <a:rPr lang="pt-BR" smtClean="0"/>
-              <a:t>11/02/2024</a:t>
+              <a:t>20/02/2024</a:t>
             </a:fld>
             <a:endParaRPr lang="pt-BR"/>
           </a:p>
@@ -2700,7 +2700,7 @@
           <a:p>
             <a:fld id="{2A8F3A04-A449-4461-BE57-D0A4985AEFEF}" type="datetimeFigureOut">
               <a:rPr lang="pt-BR" smtClean="0"/>
-              <a:t>11/02/2024</a:t>
+              <a:t>20/02/2024</a:t>
             </a:fld>
             <a:endParaRPr lang="pt-BR"/>
           </a:p>
@@ -2813,7 +2813,7 @@
           <a:p>
             <a:fld id="{2A8F3A04-A449-4461-BE57-D0A4985AEFEF}" type="datetimeFigureOut">
               <a:rPr lang="pt-BR" smtClean="0"/>
-              <a:t>11/02/2024</a:t>
+              <a:t>20/02/2024</a:t>
             </a:fld>
             <a:endParaRPr lang="pt-BR"/>
           </a:p>
@@ -3124,7 +3124,7 @@
           <a:p>
             <a:fld id="{2A8F3A04-A449-4461-BE57-D0A4985AEFEF}" type="datetimeFigureOut">
               <a:rPr lang="pt-BR" smtClean="0"/>
-              <a:t>11/02/2024</a:t>
+              <a:t>20/02/2024</a:t>
             </a:fld>
             <a:endParaRPr lang="pt-BR"/>
           </a:p>
@@ -3412,7 +3412,7 @@
           <a:p>
             <a:fld id="{2A8F3A04-A449-4461-BE57-D0A4985AEFEF}" type="datetimeFigureOut">
               <a:rPr lang="pt-BR" smtClean="0"/>
-              <a:t>11/02/2024</a:t>
+              <a:t>20/02/2024</a:t>
             </a:fld>
             <a:endParaRPr lang="pt-BR"/>
           </a:p>
@@ -3653,7 +3653,7 @@
           <a:p>
             <a:fld id="{2A8F3A04-A449-4461-BE57-D0A4985AEFEF}" type="datetimeFigureOut">
               <a:rPr lang="pt-BR" smtClean="0"/>
-              <a:t>11/02/2024</a:t>
+              <a:t>20/02/2024</a:t>
             </a:fld>
             <a:endParaRPr lang="pt-BR"/>
           </a:p>
@@ -21976,9 +21976,8 @@
             <a:avLst/>
           </a:prstGeom>
           <a:solidFill>
-            <a:schemeClr val="tx1">
+            <a:schemeClr val="bg1">
               <a:lumMod val="75000"/>
-              <a:lumOff val="25000"/>
             </a:schemeClr>
           </a:solidFill>
           <a:ln>

</xml_diff>